<commit_message>
Edited Chapter 2 of Literature Review
</commit_message>
<xml_diff>
--- a/LHCb/LHCb Meeting Literature Review Talk 6-12-2022.pptx
+++ b/LHCb/LHCb Meeting Literature Review Talk 6-12-2022.pptx
@@ -215,7 +215,7 @@
           <a:p>
             <a:fld id="{B50B3618-E65C-4C92-AA5E-9B70DC8F537B}" type="datetimeFigureOut">
               <a:rPr lang="en-AU" smtClean="0"/>
-              <a:t>16/01/2023</a:t>
+              <a:t>1/02/2023</a:t>
             </a:fld>
             <a:endParaRPr lang="en-AU"/>
           </a:p>
@@ -2963,7 +2963,7 @@
           <a:p>
             <a:fld id="{7F566F2C-482B-48A7-BAD4-BFEA4106DEB5}" type="datetimeFigureOut">
               <a:rPr lang="en-AU" smtClean="0"/>
-              <a:t>16/01/2023</a:t>
+              <a:t>1/02/2023</a:t>
             </a:fld>
             <a:endParaRPr lang="en-AU"/>
           </a:p>
@@ -3163,7 +3163,7 @@
           <a:p>
             <a:fld id="{7F566F2C-482B-48A7-BAD4-BFEA4106DEB5}" type="datetimeFigureOut">
               <a:rPr lang="en-AU" smtClean="0"/>
-              <a:t>16/01/2023</a:t>
+              <a:t>1/02/2023</a:t>
             </a:fld>
             <a:endParaRPr lang="en-AU"/>
           </a:p>
@@ -3373,7 +3373,7 @@
           <a:p>
             <a:fld id="{7F566F2C-482B-48A7-BAD4-BFEA4106DEB5}" type="datetimeFigureOut">
               <a:rPr lang="en-AU" smtClean="0"/>
-              <a:t>16/01/2023</a:t>
+              <a:t>1/02/2023</a:t>
             </a:fld>
             <a:endParaRPr lang="en-AU"/>
           </a:p>
@@ -3573,7 +3573,7 @@
           <a:p>
             <a:fld id="{7F566F2C-482B-48A7-BAD4-BFEA4106DEB5}" type="datetimeFigureOut">
               <a:rPr lang="en-AU" smtClean="0"/>
-              <a:t>16/01/2023</a:t>
+              <a:t>1/02/2023</a:t>
             </a:fld>
             <a:endParaRPr lang="en-AU"/>
           </a:p>
@@ -3849,7 +3849,7 @@
           <a:p>
             <a:fld id="{7F566F2C-482B-48A7-BAD4-BFEA4106DEB5}" type="datetimeFigureOut">
               <a:rPr lang="en-AU" smtClean="0"/>
-              <a:t>16/01/2023</a:t>
+              <a:t>1/02/2023</a:t>
             </a:fld>
             <a:endParaRPr lang="en-AU"/>
           </a:p>
@@ -4117,7 +4117,7 @@
           <a:p>
             <a:fld id="{7F566F2C-482B-48A7-BAD4-BFEA4106DEB5}" type="datetimeFigureOut">
               <a:rPr lang="en-AU" smtClean="0"/>
-              <a:t>16/01/2023</a:t>
+              <a:t>1/02/2023</a:t>
             </a:fld>
             <a:endParaRPr lang="en-AU"/>
           </a:p>
@@ -4532,7 +4532,7 @@
           <a:p>
             <a:fld id="{7F566F2C-482B-48A7-BAD4-BFEA4106DEB5}" type="datetimeFigureOut">
               <a:rPr lang="en-AU" smtClean="0"/>
-              <a:t>16/01/2023</a:t>
+              <a:t>1/02/2023</a:t>
             </a:fld>
             <a:endParaRPr lang="en-AU"/>
           </a:p>
@@ -4674,7 +4674,7 @@
           <a:p>
             <a:fld id="{7F566F2C-482B-48A7-BAD4-BFEA4106DEB5}" type="datetimeFigureOut">
               <a:rPr lang="en-AU" smtClean="0"/>
-              <a:t>16/01/2023</a:t>
+              <a:t>1/02/2023</a:t>
             </a:fld>
             <a:endParaRPr lang="en-AU"/>
           </a:p>
@@ -4787,7 +4787,7 @@
           <a:p>
             <a:fld id="{7F566F2C-482B-48A7-BAD4-BFEA4106DEB5}" type="datetimeFigureOut">
               <a:rPr lang="en-AU" smtClean="0"/>
-              <a:t>16/01/2023</a:t>
+              <a:t>1/02/2023</a:t>
             </a:fld>
             <a:endParaRPr lang="en-AU"/>
           </a:p>
@@ -5100,7 +5100,7 @@
           <a:p>
             <a:fld id="{7F566F2C-482B-48A7-BAD4-BFEA4106DEB5}" type="datetimeFigureOut">
               <a:rPr lang="en-AU" smtClean="0"/>
-              <a:t>16/01/2023</a:t>
+              <a:t>1/02/2023</a:t>
             </a:fld>
             <a:endParaRPr lang="en-AU"/>
           </a:p>
@@ -5389,7 +5389,7 @@
           <a:p>
             <a:fld id="{7F566F2C-482B-48A7-BAD4-BFEA4106DEB5}" type="datetimeFigureOut">
               <a:rPr lang="en-AU" smtClean="0"/>
-              <a:t>16/01/2023</a:t>
+              <a:t>1/02/2023</a:t>
             </a:fld>
             <a:endParaRPr lang="en-AU"/>
           </a:p>
@@ -5632,7 +5632,7 @@
           <a:p>
             <a:fld id="{7F566F2C-482B-48A7-BAD4-BFEA4106DEB5}" type="datetimeFigureOut">
               <a:rPr lang="en-AU" smtClean="0"/>
-              <a:t>16/01/2023</a:t>
+              <a:t>1/02/2023</a:t>
             </a:fld>
             <a:endParaRPr lang="en-AU"/>
           </a:p>
@@ -9277,8 +9277,8 @@
         </p:blipFill>
         <p:spPr>
           <a:xfrm>
-            <a:off x="6096000" y="2545674"/>
-            <a:ext cx="5875052" cy="2911240"/>
+            <a:off x="5940583" y="2575956"/>
+            <a:ext cx="6030469" cy="2988253"/>
           </a:xfrm>
           <a:prstGeom prst="rect">
             <a:avLst/>

</xml_diff>

<commit_message>
Added Coursework II and Research Files
</commit_message>
<xml_diff>
--- a/LHCb/LHCb Meeting Literature Review Talk 6-12-2022.pptx
+++ b/LHCb/LHCb Meeting Literature Review Talk 6-12-2022.pptx
@@ -215,7 +215,7 @@
           <a:p>
             <a:fld id="{B50B3618-E65C-4C92-AA5E-9B70DC8F537B}" type="datetimeFigureOut">
               <a:rPr lang="en-AU" smtClean="0"/>
-              <a:t>1/02/2023</a:t>
+              <a:t>31/03/2023</a:t>
             </a:fld>
             <a:endParaRPr lang="en-AU"/>
           </a:p>
@@ -2963,7 +2963,7 @@
           <a:p>
             <a:fld id="{7F566F2C-482B-48A7-BAD4-BFEA4106DEB5}" type="datetimeFigureOut">
               <a:rPr lang="en-AU" smtClean="0"/>
-              <a:t>1/02/2023</a:t>
+              <a:t>31/03/2023</a:t>
             </a:fld>
             <a:endParaRPr lang="en-AU"/>
           </a:p>
@@ -3163,7 +3163,7 @@
           <a:p>
             <a:fld id="{7F566F2C-482B-48A7-BAD4-BFEA4106DEB5}" type="datetimeFigureOut">
               <a:rPr lang="en-AU" smtClean="0"/>
-              <a:t>1/02/2023</a:t>
+              <a:t>31/03/2023</a:t>
             </a:fld>
             <a:endParaRPr lang="en-AU"/>
           </a:p>
@@ -3373,7 +3373,7 @@
           <a:p>
             <a:fld id="{7F566F2C-482B-48A7-BAD4-BFEA4106DEB5}" type="datetimeFigureOut">
               <a:rPr lang="en-AU" smtClean="0"/>
-              <a:t>1/02/2023</a:t>
+              <a:t>31/03/2023</a:t>
             </a:fld>
             <a:endParaRPr lang="en-AU"/>
           </a:p>
@@ -3573,7 +3573,7 @@
           <a:p>
             <a:fld id="{7F566F2C-482B-48A7-BAD4-BFEA4106DEB5}" type="datetimeFigureOut">
               <a:rPr lang="en-AU" smtClean="0"/>
-              <a:t>1/02/2023</a:t>
+              <a:t>31/03/2023</a:t>
             </a:fld>
             <a:endParaRPr lang="en-AU"/>
           </a:p>
@@ -3849,7 +3849,7 @@
           <a:p>
             <a:fld id="{7F566F2C-482B-48A7-BAD4-BFEA4106DEB5}" type="datetimeFigureOut">
               <a:rPr lang="en-AU" smtClean="0"/>
-              <a:t>1/02/2023</a:t>
+              <a:t>31/03/2023</a:t>
             </a:fld>
             <a:endParaRPr lang="en-AU"/>
           </a:p>
@@ -4117,7 +4117,7 @@
           <a:p>
             <a:fld id="{7F566F2C-482B-48A7-BAD4-BFEA4106DEB5}" type="datetimeFigureOut">
               <a:rPr lang="en-AU" smtClean="0"/>
-              <a:t>1/02/2023</a:t>
+              <a:t>31/03/2023</a:t>
             </a:fld>
             <a:endParaRPr lang="en-AU"/>
           </a:p>
@@ -4532,7 +4532,7 @@
           <a:p>
             <a:fld id="{7F566F2C-482B-48A7-BAD4-BFEA4106DEB5}" type="datetimeFigureOut">
               <a:rPr lang="en-AU" smtClean="0"/>
-              <a:t>1/02/2023</a:t>
+              <a:t>31/03/2023</a:t>
             </a:fld>
             <a:endParaRPr lang="en-AU"/>
           </a:p>
@@ -4674,7 +4674,7 @@
           <a:p>
             <a:fld id="{7F566F2C-482B-48A7-BAD4-BFEA4106DEB5}" type="datetimeFigureOut">
               <a:rPr lang="en-AU" smtClean="0"/>
-              <a:t>1/02/2023</a:t>
+              <a:t>31/03/2023</a:t>
             </a:fld>
             <a:endParaRPr lang="en-AU"/>
           </a:p>
@@ -4787,7 +4787,7 @@
           <a:p>
             <a:fld id="{7F566F2C-482B-48A7-BAD4-BFEA4106DEB5}" type="datetimeFigureOut">
               <a:rPr lang="en-AU" smtClean="0"/>
-              <a:t>1/02/2023</a:t>
+              <a:t>31/03/2023</a:t>
             </a:fld>
             <a:endParaRPr lang="en-AU"/>
           </a:p>
@@ -5100,7 +5100,7 @@
           <a:p>
             <a:fld id="{7F566F2C-482B-48A7-BAD4-BFEA4106DEB5}" type="datetimeFigureOut">
               <a:rPr lang="en-AU" smtClean="0"/>
-              <a:t>1/02/2023</a:t>
+              <a:t>31/03/2023</a:t>
             </a:fld>
             <a:endParaRPr lang="en-AU"/>
           </a:p>
@@ -5389,7 +5389,7 @@
           <a:p>
             <a:fld id="{7F566F2C-482B-48A7-BAD4-BFEA4106DEB5}" type="datetimeFigureOut">
               <a:rPr lang="en-AU" smtClean="0"/>
-              <a:t>1/02/2023</a:t>
+              <a:t>31/03/2023</a:t>
             </a:fld>
             <a:endParaRPr lang="en-AU"/>
           </a:p>
@@ -5632,7 +5632,7 @@
           <a:p>
             <a:fld id="{7F566F2C-482B-48A7-BAD4-BFEA4106DEB5}" type="datetimeFigureOut">
               <a:rPr lang="en-AU" smtClean="0"/>
-              <a:t>1/02/2023</a:t>
+              <a:t>31/03/2023</a:t>
             </a:fld>
             <a:endParaRPr lang="en-AU"/>
           </a:p>
@@ -9247,7 +9247,7 @@
         </p:blipFill>
         <p:spPr>
           <a:xfrm>
-            <a:off x="220948" y="2613637"/>
+            <a:off x="220948" y="2614461"/>
             <a:ext cx="5971428" cy="2911241"/>
           </a:xfrm>
           <a:prstGeom prst="rect">

</xml_diff>